<commit_message>
update proposal dan progress
Proposal
- Aplikasi web -> desktop

Progress
- Menambah wireframe GUI
</commit_message>
<xml_diff>
--- a/Presentations/Progress 15 Mei.pptx
+++ b/Presentations/Progress 15 Mei.pptx
@@ -1,13 +1,14 @@
 
 <file path=ppt/presentation.xml><?xml version="1.0" encoding="utf-8"?>
-<p:presentation xmlns:a="http://schemas.openxmlformats.org/drawingml/2006/main" xmlns:r="http://schemas.openxmlformats.org/officeDocument/2006/relationships" xmlns:p="http://schemas.openxmlformats.org/presentationml/2006/main" saveSubsetFonts="1">
+<p:presentation xmlns:a="http://schemas.openxmlformats.org/drawingml/2006/main" xmlns:r="http://schemas.openxmlformats.org/officeDocument/2006/relationships" xmlns:p="http://schemas.openxmlformats.org/presentationml/2006/main">
   <p:sldMasterIdLst>
     <p:sldMasterId id="2147483648" r:id="rId1"/>
   </p:sldMasterIdLst>
   <p:sldIdLst>
-    <p:sldId id="256" r:id="rId2"/>
-    <p:sldId id="257" r:id="rId3"/>
-    <p:sldId id="258" r:id="rId4"/>
+    <p:sldId id="256" r:id="rId3"/>
+    <p:sldId id="257" r:id="rId4"/>
+    <p:sldId id="259" r:id="rId5"/>
+    <p:sldId id="258" r:id="rId6"/>
   </p:sldIdLst>
   <p:sldSz cx="12192000" cy="6858000"/>
   <p:notesSz cx="6858000" cy="9144000"/>
@@ -128,13 +129,7 @@
       </p:grpSpPr>
       <p:sp>
         <p:nvSpPr>
-          <p:cNvPr id="2" name="Title 1">
-            <a:extLst>
-              <a:ext uri="{FF2B5EF4-FFF2-40B4-BE49-F238E27FC236}">
-                <a16:creationId xmlns:a16="http://schemas.microsoft.com/office/drawing/2014/main" id="{3231BEED-FAC3-4ECA-8775-B283CB53B329}"/>
-              </a:ext>
-            </a:extLst>
-          </p:cNvPr>
+          <p:cNvPr id="2" name="Title 1"/>
           <p:cNvSpPr>
             <a:spLocks noGrp="1"/>
           </p:cNvSpPr>
@@ -160,18 +155,13 @@
               <a:rPr lang="en-US"/>
               <a:t>Click to edit Master title style</a:t>
             </a:r>
-          </a:p>
-        </p:txBody>
-      </p:sp>
-      <p:sp>
-        <p:nvSpPr>
-          <p:cNvPr id="3" name="Subtitle 2">
-            <a:extLst>
-              <a:ext uri="{FF2B5EF4-FFF2-40B4-BE49-F238E27FC236}">
-                <a16:creationId xmlns:a16="http://schemas.microsoft.com/office/drawing/2014/main" id="{522A0857-3D74-4E11-9DF9-DDF67FA13A0B}"/>
-              </a:ext>
-            </a:extLst>
-          </p:cNvPr>
+            <a:endParaRPr lang="en-US"/>
+          </a:p>
+        </p:txBody>
+      </p:sp>
+      <p:sp>
+        <p:nvSpPr>
+          <p:cNvPr id="3" name="Subtitle 2"/>
           <p:cNvSpPr>
             <a:spLocks noGrp="1"/>
           </p:cNvSpPr>
@@ -230,18 +220,13 @@
               <a:rPr lang="en-US"/>
               <a:t>Click to edit Master subtitle style</a:t>
             </a:r>
-          </a:p>
-        </p:txBody>
-      </p:sp>
-      <p:sp>
-        <p:nvSpPr>
-          <p:cNvPr id="4" name="Date Placeholder 3">
-            <a:extLst>
-              <a:ext uri="{FF2B5EF4-FFF2-40B4-BE49-F238E27FC236}">
-                <a16:creationId xmlns:a16="http://schemas.microsoft.com/office/drawing/2014/main" id="{6EB75275-B6A3-4EC9-BD87-C5AAA44FFE00}"/>
-              </a:ext>
-            </a:extLst>
-          </p:cNvPr>
+            <a:endParaRPr lang="en-US"/>
+          </a:p>
+        </p:txBody>
+      </p:sp>
+      <p:sp>
+        <p:nvSpPr>
+          <p:cNvPr id="4" name="Date Placeholder 3"/>
           <p:cNvSpPr>
             <a:spLocks noGrp="1"/>
           </p:cNvSpPr>
@@ -256,7 +241,6 @@
           <a:p>
             <a:fld id="{2878B8A3-BBD2-47F7-8BFF-31B2485CEB88}" type="datetimeFigureOut">
               <a:rPr lang="en-US" smtClean="0"/>
-              <a:t>5/15/2020</a:t>
             </a:fld>
             <a:endParaRPr lang="en-US"/>
           </a:p>
@@ -264,13 +248,7 @@
       </p:sp>
       <p:sp>
         <p:nvSpPr>
-          <p:cNvPr id="5" name="Footer Placeholder 4">
-            <a:extLst>
-              <a:ext uri="{FF2B5EF4-FFF2-40B4-BE49-F238E27FC236}">
-                <a16:creationId xmlns:a16="http://schemas.microsoft.com/office/drawing/2014/main" id="{770DEAF1-E93F-43D7-A477-ED7D7D70F964}"/>
-              </a:ext>
-            </a:extLst>
-          </p:cNvPr>
+          <p:cNvPr id="5" name="Footer Placeholder 4"/>
           <p:cNvSpPr>
             <a:spLocks noGrp="1"/>
           </p:cNvSpPr>
@@ -289,13 +267,7 @@
       </p:sp>
       <p:sp>
         <p:nvSpPr>
-          <p:cNvPr id="6" name="Slide Number Placeholder 5">
-            <a:extLst>
-              <a:ext uri="{FF2B5EF4-FFF2-40B4-BE49-F238E27FC236}">
-                <a16:creationId xmlns:a16="http://schemas.microsoft.com/office/drawing/2014/main" id="{4B9C5FD3-49CD-495D-8B24-FF625BDE8677}"/>
-              </a:ext>
-            </a:extLst>
-          </p:cNvPr>
+          <p:cNvPr id="6" name="Slide Number Placeholder 5"/>
           <p:cNvSpPr>
             <a:spLocks noGrp="1"/>
           </p:cNvSpPr>
@@ -310,18 +282,12 @@
           <a:p>
             <a:fld id="{AE807771-59EF-494D-A6AC-A4C25B6BEE57}" type="slidenum">
               <a:rPr lang="en-US" smtClean="0"/>
-              <a:t>‹#›</a:t>
             </a:fld>
             <a:endParaRPr lang="en-US"/>
           </a:p>
         </p:txBody>
       </p:sp>
     </p:spTree>
-    <p:extLst>
-      <p:ext uri="{BB962C8B-B14F-4D97-AF65-F5344CB8AC3E}">
-        <p14:creationId xmlns:p14="http://schemas.microsoft.com/office/powerpoint/2010/main" val="3793846460"/>
-      </p:ext>
-    </p:extLst>
   </p:cSld>
   <p:clrMapOvr>
     <a:masterClrMapping/>
@@ -348,13 +314,7 @@
       </p:grpSpPr>
       <p:sp>
         <p:nvSpPr>
-          <p:cNvPr id="2" name="Title 1">
-            <a:extLst>
-              <a:ext uri="{FF2B5EF4-FFF2-40B4-BE49-F238E27FC236}">
-                <a16:creationId xmlns:a16="http://schemas.microsoft.com/office/drawing/2014/main" id="{2174E1E6-982C-4656-9B2F-DBCED5DB308B}"/>
-              </a:ext>
-            </a:extLst>
-          </p:cNvPr>
+          <p:cNvPr id="2" name="Title 1"/>
           <p:cNvSpPr>
             <a:spLocks noGrp="1"/>
           </p:cNvSpPr>
@@ -371,18 +331,13 @@
               <a:rPr lang="en-US"/>
               <a:t>Click to edit Master title style</a:t>
             </a:r>
-          </a:p>
-        </p:txBody>
-      </p:sp>
-      <p:sp>
-        <p:nvSpPr>
-          <p:cNvPr id="3" name="Vertical Text Placeholder 2">
-            <a:extLst>
-              <a:ext uri="{FF2B5EF4-FFF2-40B4-BE49-F238E27FC236}">
-                <a16:creationId xmlns:a16="http://schemas.microsoft.com/office/drawing/2014/main" id="{E9822624-FE87-4B7F-95B1-0D454F691995}"/>
-              </a:ext>
-            </a:extLst>
-          </p:cNvPr>
+            <a:endParaRPr lang="en-US"/>
+          </a:p>
+        </p:txBody>
+      </p:sp>
+      <p:sp>
+        <p:nvSpPr>
+          <p:cNvPr id="3" name="Vertical Text Placeholder 2"/>
           <p:cNvSpPr>
             <a:spLocks noGrp="1"/>
           </p:cNvSpPr>
@@ -400,6 +355,7 @@
               <a:rPr lang="en-US"/>
               <a:t>Click to edit Master text styles</a:t>
             </a:r>
+            <a:endParaRPr lang="en-US"/>
           </a:p>
           <a:p>
             <a:pPr lvl="1"/>
@@ -407,6 +363,7 @@
               <a:rPr lang="en-US"/>
               <a:t>Second level</a:t>
             </a:r>
+            <a:endParaRPr lang="en-US"/>
           </a:p>
           <a:p>
             <a:pPr lvl="2"/>
@@ -414,6 +371,7 @@
               <a:rPr lang="en-US"/>
               <a:t>Third level</a:t>
             </a:r>
+            <a:endParaRPr lang="en-US"/>
           </a:p>
           <a:p>
             <a:pPr lvl="3"/>
@@ -421,6 +379,7 @@
               <a:rPr lang="en-US"/>
               <a:t>Fourth level</a:t>
             </a:r>
+            <a:endParaRPr lang="en-US"/>
           </a:p>
           <a:p>
             <a:pPr lvl="4"/>
@@ -428,18 +387,13 @@
               <a:rPr lang="en-US"/>
               <a:t>Fifth level</a:t>
             </a:r>
-          </a:p>
-        </p:txBody>
-      </p:sp>
-      <p:sp>
-        <p:nvSpPr>
-          <p:cNvPr id="4" name="Date Placeholder 3">
-            <a:extLst>
-              <a:ext uri="{FF2B5EF4-FFF2-40B4-BE49-F238E27FC236}">
-                <a16:creationId xmlns:a16="http://schemas.microsoft.com/office/drawing/2014/main" id="{44F58A1B-F789-46C4-9BB4-958AA33C9E81}"/>
-              </a:ext>
-            </a:extLst>
-          </p:cNvPr>
+            <a:endParaRPr lang="en-US"/>
+          </a:p>
+        </p:txBody>
+      </p:sp>
+      <p:sp>
+        <p:nvSpPr>
+          <p:cNvPr id="4" name="Date Placeholder 3"/>
           <p:cNvSpPr>
             <a:spLocks noGrp="1"/>
           </p:cNvSpPr>
@@ -454,7 +408,6 @@
           <a:p>
             <a:fld id="{2878B8A3-BBD2-47F7-8BFF-31B2485CEB88}" type="datetimeFigureOut">
               <a:rPr lang="en-US" smtClean="0"/>
-              <a:t>5/15/2020</a:t>
             </a:fld>
             <a:endParaRPr lang="en-US"/>
           </a:p>
@@ -462,13 +415,7 @@
       </p:sp>
       <p:sp>
         <p:nvSpPr>
-          <p:cNvPr id="5" name="Footer Placeholder 4">
-            <a:extLst>
-              <a:ext uri="{FF2B5EF4-FFF2-40B4-BE49-F238E27FC236}">
-                <a16:creationId xmlns:a16="http://schemas.microsoft.com/office/drawing/2014/main" id="{6CEA6870-12E5-4998-AFA4-1A12396B6CE1}"/>
-              </a:ext>
-            </a:extLst>
-          </p:cNvPr>
+          <p:cNvPr id="5" name="Footer Placeholder 4"/>
           <p:cNvSpPr>
             <a:spLocks noGrp="1"/>
           </p:cNvSpPr>
@@ -487,13 +434,7 @@
       </p:sp>
       <p:sp>
         <p:nvSpPr>
-          <p:cNvPr id="6" name="Slide Number Placeholder 5">
-            <a:extLst>
-              <a:ext uri="{FF2B5EF4-FFF2-40B4-BE49-F238E27FC236}">
-                <a16:creationId xmlns:a16="http://schemas.microsoft.com/office/drawing/2014/main" id="{8AF927C7-0D6A-43A9-941A-ACF289D8D4F5}"/>
-              </a:ext>
-            </a:extLst>
-          </p:cNvPr>
+          <p:cNvPr id="6" name="Slide Number Placeholder 5"/>
           <p:cNvSpPr>
             <a:spLocks noGrp="1"/>
           </p:cNvSpPr>
@@ -508,18 +449,12 @@
           <a:p>
             <a:fld id="{AE807771-59EF-494D-A6AC-A4C25B6BEE57}" type="slidenum">
               <a:rPr lang="en-US" smtClean="0"/>
-              <a:t>‹#›</a:t>
             </a:fld>
             <a:endParaRPr lang="en-US"/>
           </a:p>
         </p:txBody>
       </p:sp>
     </p:spTree>
-    <p:extLst>
-      <p:ext uri="{BB962C8B-B14F-4D97-AF65-F5344CB8AC3E}">
-        <p14:creationId xmlns:p14="http://schemas.microsoft.com/office/powerpoint/2010/main" val="694163606"/>
-      </p:ext>
-    </p:extLst>
   </p:cSld>
   <p:clrMapOvr>
     <a:masterClrMapping/>
@@ -546,13 +481,7 @@
       </p:grpSpPr>
       <p:sp>
         <p:nvSpPr>
-          <p:cNvPr id="2" name="Vertical Title 1">
-            <a:extLst>
-              <a:ext uri="{FF2B5EF4-FFF2-40B4-BE49-F238E27FC236}">
-                <a16:creationId xmlns:a16="http://schemas.microsoft.com/office/drawing/2014/main" id="{6B693BDE-BE76-4EAD-814F-016DB1AE6E78}"/>
-              </a:ext>
-            </a:extLst>
-          </p:cNvPr>
+          <p:cNvPr id="2" name="Vertical Title 1"/>
           <p:cNvSpPr>
             <a:spLocks noGrp="1"/>
           </p:cNvSpPr>
@@ -574,18 +503,13 @@
               <a:rPr lang="en-US"/>
               <a:t>Click to edit Master title style</a:t>
             </a:r>
-          </a:p>
-        </p:txBody>
-      </p:sp>
-      <p:sp>
-        <p:nvSpPr>
-          <p:cNvPr id="3" name="Vertical Text Placeholder 2">
-            <a:extLst>
-              <a:ext uri="{FF2B5EF4-FFF2-40B4-BE49-F238E27FC236}">
-                <a16:creationId xmlns:a16="http://schemas.microsoft.com/office/drawing/2014/main" id="{46B265A4-FDBB-4CED-83DC-8A0BB23D9F45}"/>
-              </a:ext>
-            </a:extLst>
-          </p:cNvPr>
+            <a:endParaRPr lang="en-US"/>
+          </a:p>
+        </p:txBody>
+      </p:sp>
+      <p:sp>
+        <p:nvSpPr>
+          <p:cNvPr id="3" name="Vertical Text Placeholder 2"/>
           <p:cNvSpPr>
             <a:spLocks noGrp="1"/>
           </p:cNvSpPr>
@@ -608,6 +532,7 @@
               <a:rPr lang="en-US"/>
               <a:t>Click to edit Master text styles</a:t>
             </a:r>
+            <a:endParaRPr lang="en-US"/>
           </a:p>
           <a:p>
             <a:pPr lvl="1"/>
@@ -615,6 +540,7 @@
               <a:rPr lang="en-US"/>
               <a:t>Second level</a:t>
             </a:r>
+            <a:endParaRPr lang="en-US"/>
           </a:p>
           <a:p>
             <a:pPr lvl="2"/>
@@ -622,6 +548,7 @@
               <a:rPr lang="en-US"/>
               <a:t>Third level</a:t>
             </a:r>
+            <a:endParaRPr lang="en-US"/>
           </a:p>
           <a:p>
             <a:pPr lvl="3"/>
@@ -629,6 +556,7 @@
               <a:rPr lang="en-US"/>
               <a:t>Fourth level</a:t>
             </a:r>
+            <a:endParaRPr lang="en-US"/>
           </a:p>
           <a:p>
             <a:pPr lvl="4"/>
@@ -636,18 +564,13 @@
               <a:rPr lang="en-US"/>
               <a:t>Fifth level</a:t>
             </a:r>
-          </a:p>
-        </p:txBody>
-      </p:sp>
-      <p:sp>
-        <p:nvSpPr>
-          <p:cNvPr id="4" name="Date Placeholder 3">
-            <a:extLst>
-              <a:ext uri="{FF2B5EF4-FFF2-40B4-BE49-F238E27FC236}">
-                <a16:creationId xmlns:a16="http://schemas.microsoft.com/office/drawing/2014/main" id="{C85DBF0D-82E1-47AB-8E1A-778F24E67C50}"/>
-              </a:ext>
-            </a:extLst>
-          </p:cNvPr>
+            <a:endParaRPr lang="en-US"/>
+          </a:p>
+        </p:txBody>
+      </p:sp>
+      <p:sp>
+        <p:nvSpPr>
+          <p:cNvPr id="4" name="Date Placeholder 3"/>
           <p:cNvSpPr>
             <a:spLocks noGrp="1"/>
           </p:cNvSpPr>
@@ -662,7 +585,6 @@
           <a:p>
             <a:fld id="{2878B8A3-BBD2-47F7-8BFF-31B2485CEB88}" type="datetimeFigureOut">
               <a:rPr lang="en-US" smtClean="0"/>
-              <a:t>5/15/2020</a:t>
             </a:fld>
             <a:endParaRPr lang="en-US"/>
           </a:p>
@@ -670,13 +592,7 @@
       </p:sp>
       <p:sp>
         <p:nvSpPr>
-          <p:cNvPr id="5" name="Footer Placeholder 4">
-            <a:extLst>
-              <a:ext uri="{FF2B5EF4-FFF2-40B4-BE49-F238E27FC236}">
-                <a16:creationId xmlns:a16="http://schemas.microsoft.com/office/drawing/2014/main" id="{251A004C-0E8A-4B6F-AAE2-85DC84370757}"/>
-              </a:ext>
-            </a:extLst>
-          </p:cNvPr>
+          <p:cNvPr id="5" name="Footer Placeholder 4"/>
           <p:cNvSpPr>
             <a:spLocks noGrp="1"/>
           </p:cNvSpPr>
@@ -695,13 +611,7 @@
       </p:sp>
       <p:sp>
         <p:nvSpPr>
-          <p:cNvPr id="6" name="Slide Number Placeholder 5">
-            <a:extLst>
-              <a:ext uri="{FF2B5EF4-FFF2-40B4-BE49-F238E27FC236}">
-                <a16:creationId xmlns:a16="http://schemas.microsoft.com/office/drawing/2014/main" id="{96545E24-93BC-4C07-BDD3-6B598F6E4713}"/>
-              </a:ext>
-            </a:extLst>
-          </p:cNvPr>
+          <p:cNvPr id="6" name="Slide Number Placeholder 5"/>
           <p:cNvSpPr>
             <a:spLocks noGrp="1"/>
           </p:cNvSpPr>
@@ -716,18 +626,12 @@
           <a:p>
             <a:fld id="{AE807771-59EF-494D-A6AC-A4C25B6BEE57}" type="slidenum">
               <a:rPr lang="en-US" smtClean="0"/>
-              <a:t>‹#›</a:t>
             </a:fld>
             <a:endParaRPr lang="en-US"/>
           </a:p>
         </p:txBody>
       </p:sp>
     </p:spTree>
-    <p:extLst>
-      <p:ext uri="{BB962C8B-B14F-4D97-AF65-F5344CB8AC3E}">
-        <p14:creationId xmlns:p14="http://schemas.microsoft.com/office/powerpoint/2010/main" val="3326368680"/>
-      </p:ext>
-    </p:extLst>
   </p:cSld>
   <p:clrMapOvr>
     <a:masterClrMapping/>
@@ -754,13 +658,7 @@
       </p:grpSpPr>
       <p:sp>
         <p:nvSpPr>
-          <p:cNvPr id="2" name="Title 1">
-            <a:extLst>
-              <a:ext uri="{FF2B5EF4-FFF2-40B4-BE49-F238E27FC236}">
-                <a16:creationId xmlns:a16="http://schemas.microsoft.com/office/drawing/2014/main" id="{6ADDA1C4-C351-4EA3-90B4-B3892075AA21}"/>
-              </a:ext>
-            </a:extLst>
-          </p:cNvPr>
+          <p:cNvPr id="2" name="Title 1"/>
           <p:cNvSpPr>
             <a:spLocks noGrp="1"/>
           </p:cNvSpPr>
@@ -777,18 +675,13 @@
               <a:rPr lang="en-US"/>
               <a:t>Click to edit Master title style</a:t>
             </a:r>
-          </a:p>
-        </p:txBody>
-      </p:sp>
-      <p:sp>
-        <p:nvSpPr>
-          <p:cNvPr id="3" name="Content Placeholder 2">
-            <a:extLst>
-              <a:ext uri="{FF2B5EF4-FFF2-40B4-BE49-F238E27FC236}">
-                <a16:creationId xmlns:a16="http://schemas.microsoft.com/office/drawing/2014/main" id="{98FACDB6-3D7A-42A7-922F-F8602527E3FD}"/>
-              </a:ext>
-            </a:extLst>
-          </p:cNvPr>
+            <a:endParaRPr lang="en-US"/>
+          </a:p>
+        </p:txBody>
+      </p:sp>
+      <p:sp>
+        <p:nvSpPr>
+          <p:cNvPr id="3" name="Content Placeholder 2"/>
           <p:cNvSpPr>
             <a:spLocks noGrp="1"/>
           </p:cNvSpPr>
@@ -806,6 +699,7 @@
               <a:rPr lang="en-US"/>
               <a:t>Click to edit Master text styles</a:t>
             </a:r>
+            <a:endParaRPr lang="en-US"/>
           </a:p>
           <a:p>
             <a:pPr lvl="1"/>
@@ -813,6 +707,7 @@
               <a:rPr lang="en-US"/>
               <a:t>Second level</a:t>
             </a:r>
+            <a:endParaRPr lang="en-US"/>
           </a:p>
           <a:p>
             <a:pPr lvl="2"/>
@@ -820,6 +715,7 @@
               <a:rPr lang="en-US"/>
               <a:t>Third level</a:t>
             </a:r>
+            <a:endParaRPr lang="en-US"/>
           </a:p>
           <a:p>
             <a:pPr lvl="3"/>
@@ -827,6 +723,7 @@
               <a:rPr lang="en-US"/>
               <a:t>Fourth level</a:t>
             </a:r>
+            <a:endParaRPr lang="en-US"/>
           </a:p>
           <a:p>
             <a:pPr lvl="4"/>
@@ -834,18 +731,13 @@
               <a:rPr lang="en-US"/>
               <a:t>Fifth level</a:t>
             </a:r>
-          </a:p>
-        </p:txBody>
-      </p:sp>
-      <p:sp>
-        <p:nvSpPr>
-          <p:cNvPr id="4" name="Date Placeholder 3">
-            <a:extLst>
-              <a:ext uri="{FF2B5EF4-FFF2-40B4-BE49-F238E27FC236}">
-                <a16:creationId xmlns:a16="http://schemas.microsoft.com/office/drawing/2014/main" id="{7CCA35FB-4967-44AD-9F5F-29161BEABA90}"/>
-              </a:ext>
-            </a:extLst>
-          </p:cNvPr>
+            <a:endParaRPr lang="en-US"/>
+          </a:p>
+        </p:txBody>
+      </p:sp>
+      <p:sp>
+        <p:nvSpPr>
+          <p:cNvPr id="4" name="Date Placeholder 3"/>
           <p:cNvSpPr>
             <a:spLocks noGrp="1"/>
           </p:cNvSpPr>
@@ -860,7 +752,6 @@
           <a:p>
             <a:fld id="{2878B8A3-BBD2-47F7-8BFF-31B2485CEB88}" type="datetimeFigureOut">
               <a:rPr lang="en-US" smtClean="0"/>
-              <a:t>5/15/2020</a:t>
             </a:fld>
             <a:endParaRPr lang="en-US"/>
           </a:p>
@@ -868,13 +759,7 @@
       </p:sp>
       <p:sp>
         <p:nvSpPr>
-          <p:cNvPr id="5" name="Footer Placeholder 4">
-            <a:extLst>
-              <a:ext uri="{FF2B5EF4-FFF2-40B4-BE49-F238E27FC236}">
-                <a16:creationId xmlns:a16="http://schemas.microsoft.com/office/drawing/2014/main" id="{2E9B7C4B-F5FE-42BD-AEAE-04C70D8A71A4}"/>
-              </a:ext>
-            </a:extLst>
-          </p:cNvPr>
+          <p:cNvPr id="5" name="Footer Placeholder 4"/>
           <p:cNvSpPr>
             <a:spLocks noGrp="1"/>
           </p:cNvSpPr>
@@ -893,13 +778,7 @@
       </p:sp>
       <p:sp>
         <p:nvSpPr>
-          <p:cNvPr id="6" name="Slide Number Placeholder 5">
-            <a:extLst>
-              <a:ext uri="{FF2B5EF4-FFF2-40B4-BE49-F238E27FC236}">
-                <a16:creationId xmlns:a16="http://schemas.microsoft.com/office/drawing/2014/main" id="{94162415-065A-43F5-9424-950029A6CD25}"/>
-              </a:ext>
-            </a:extLst>
-          </p:cNvPr>
+          <p:cNvPr id="6" name="Slide Number Placeholder 5"/>
           <p:cNvSpPr>
             <a:spLocks noGrp="1"/>
           </p:cNvSpPr>
@@ -914,18 +793,12 @@
           <a:p>
             <a:fld id="{AE807771-59EF-494D-A6AC-A4C25B6BEE57}" type="slidenum">
               <a:rPr lang="en-US" smtClean="0"/>
-              <a:t>‹#›</a:t>
             </a:fld>
             <a:endParaRPr lang="en-US"/>
           </a:p>
         </p:txBody>
       </p:sp>
     </p:spTree>
-    <p:extLst>
-      <p:ext uri="{BB962C8B-B14F-4D97-AF65-F5344CB8AC3E}">
-        <p14:creationId xmlns:p14="http://schemas.microsoft.com/office/powerpoint/2010/main" val="988027650"/>
-      </p:ext>
-    </p:extLst>
   </p:cSld>
   <p:clrMapOvr>
     <a:masterClrMapping/>
@@ -952,13 +825,7 @@
       </p:grpSpPr>
       <p:sp>
         <p:nvSpPr>
-          <p:cNvPr id="2" name="Title 1">
-            <a:extLst>
-              <a:ext uri="{FF2B5EF4-FFF2-40B4-BE49-F238E27FC236}">
-                <a16:creationId xmlns:a16="http://schemas.microsoft.com/office/drawing/2014/main" id="{51ADD9DA-484C-4175-A423-2D0434451FCF}"/>
-              </a:ext>
-            </a:extLst>
-          </p:cNvPr>
+          <p:cNvPr id="2" name="Title 1"/>
           <p:cNvSpPr>
             <a:spLocks noGrp="1"/>
           </p:cNvSpPr>
@@ -984,18 +851,13 @@
               <a:rPr lang="en-US"/>
               <a:t>Click to edit Master title style</a:t>
             </a:r>
-          </a:p>
-        </p:txBody>
-      </p:sp>
-      <p:sp>
-        <p:nvSpPr>
-          <p:cNvPr id="3" name="Text Placeholder 2">
-            <a:extLst>
-              <a:ext uri="{FF2B5EF4-FFF2-40B4-BE49-F238E27FC236}">
-                <a16:creationId xmlns:a16="http://schemas.microsoft.com/office/drawing/2014/main" id="{B8BA10AA-AD0D-499A-8EC3-37032554204C}"/>
-              </a:ext>
-            </a:extLst>
-          </p:cNvPr>
+            <a:endParaRPr lang="en-US"/>
+          </a:p>
+        </p:txBody>
+      </p:sp>
+      <p:sp>
+        <p:nvSpPr>
+          <p:cNvPr id="3" name="Text Placeholder 2"/>
           <p:cNvSpPr>
             <a:spLocks noGrp="1"/>
           </p:cNvSpPr>
@@ -1109,18 +971,13 @@
               <a:rPr lang="en-US"/>
               <a:t>Click to edit Master text styles</a:t>
             </a:r>
-          </a:p>
-        </p:txBody>
-      </p:sp>
-      <p:sp>
-        <p:nvSpPr>
-          <p:cNvPr id="4" name="Date Placeholder 3">
-            <a:extLst>
-              <a:ext uri="{FF2B5EF4-FFF2-40B4-BE49-F238E27FC236}">
-                <a16:creationId xmlns:a16="http://schemas.microsoft.com/office/drawing/2014/main" id="{A5686B60-DCAC-4D74-9F0F-22CE86A31345}"/>
-              </a:ext>
-            </a:extLst>
-          </p:cNvPr>
+            <a:endParaRPr lang="en-US"/>
+          </a:p>
+        </p:txBody>
+      </p:sp>
+      <p:sp>
+        <p:nvSpPr>
+          <p:cNvPr id="4" name="Date Placeholder 3"/>
           <p:cNvSpPr>
             <a:spLocks noGrp="1"/>
           </p:cNvSpPr>
@@ -1135,7 +992,6 @@
           <a:p>
             <a:fld id="{2878B8A3-BBD2-47F7-8BFF-31B2485CEB88}" type="datetimeFigureOut">
               <a:rPr lang="en-US" smtClean="0"/>
-              <a:t>5/15/2020</a:t>
             </a:fld>
             <a:endParaRPr lang="en-US"/>
           </a:p>
@@ -1143,13 +999,7 @@
       </p:sp>
       <p:sp>
         <p:nvSpPr>
-          <p:cNvPr id="5" name="Footer Placeholder 4">
-            <a:extLst>
-              <a:ext uri="{FF2B5EF4-FFF2-40B4-BE49-F238E27FC236}">
-                <a16:creationId xmlns:a16="http://schemas.microsoft.com/office/drawing/2014/main" id="{2211864C-D6FB-460A-ABB8-086418B065A8}"/>
-              </a:ext>
-            </a:extLst>
-          </p:cNvPr>
+          <p:cNvPr id="5" name="Footer Placeholder 4"/>
           <p:cNvSpPr>
             <a:spLocks noGrp="1"/>
           </p:cNvSpPr>
@@ -1168,13 +1018,7 @@
       </p:sp>
       <p:sp>
         <p:nvSpPr>
-          <p:cNvPr id="6" name="Slide Number Placeholder 5">
-            <a:extLst>
-              <a:ext uri="{FF2B5EF4-FFF2-40B4-BE49-F238E27FC236}">
-                <a16:creationId xmlns:a16="http://schemas.microsoft.com/office/drawing/2014/main" id="{6DFCDCE3-A664-49AB-B34D-8DBDBBDBEB96}"/>
-              </a:ext>
-            </a:extLst>
-          </p:cNvPr>
+          <p:cNvPr id="6" name="Slide Number Placeholder 5"/>
           <p:cNvSpPr>
             <a:spLocks noGrp="1"/>
           </p:cNvSpPr>
@@ -1189,18 +1033,12 @@
           <a:p>
             <a:fld id="{AE807771-59EF-494D-A6AC-A4C25B6BEE57}" type="slidenum">
               <a:rPr lang="en-US" smtClean="0"/>
-              <a:t>‹#›</a:t>
             </a:fld>
             <a:endParaRPr lang="en-US"/>
           </a:p>
         </p:txBody>
       </p:sp>
     </p:spTree>
-    <p:extLst>
-      <p:ext uri="{BB962C8B-B14F-4D97-AF65-F5344CB8AC3E}">
-        <p14:creationId xmlns:p14="http://schemas.microsoft.com/office/powerpoint/2010/main" val="3001927738"/>
-      </p:ext>
-    </p:extLst>
   </p:cSld>
   <p:clrMapOvr>
     <a:masterClrMapping/>
@@ -1227,13 +1065,7 @@
       </p:grpSpPr>
       <p:sp>
         <p:nvSpPr>
-          <p:cNvPr id="2" name="Title 1">
-            <a:extLst>
-              <a:ext uri="{FF2B5EF4-FFF2-40B4-BE49-F238E27FC236}">
-                <a16:creationId xmlns:a16="http://schemas.microsoft.com/office/drawing/2014/main" id="{8F0601A1-D725-4890-9689-FA2C103AE677}"/>
-              </a:ext>
-            </a:extLst>
-          </p:cNvPr>
+          <p:cNvPr id="2" name="Title 1"/>
           <p:cNvSpPr>
             <a:spLocks noGrp="1"/>
           </p:cNvSpPr>
@@ -1250,18 +1082,13 @@
               <a:rPr lang="en-US"/>
               <a:t>Click to edit Master title style</a:t>
             </a:r>
-          </a:p>
-        </p:txBody>
-      </p:sp>
-      <p:sp>
-        <p:nvSpPr>
-          <p:cNvPr id="3" name="Content Placeholder 2">
-            <a:extLst>
-              <a:ext uri="{FF2B5EF4-FFF2-40B4-BE49-F238E27FC236}">
-                <a16:creationId xmlns:a16="http://schemas.microsoft.com/office/drawing/2014/main" id="{6AB3AF3E-B806-4A03-BA54-CA4033394111}"/>
-              </a:ext>
-            </a:extLst>
-          </p:cNvPr>
+            <a:endParaRPr lang="en-US"/>
+          </a:p>
+        </p:txBody>
+      </p:sp>
+      <p:sp>
+        <p:nvSpPr>
+          <p:cNvPr id="3" name="Content Placeholder 2"/>
           <p:cNvSpPr>
             <a:spLocks noGrp="1"/>
           </p:cNvSpPr>
@@ -1284,6 +1111,7 @@
               <a:rPr lang="en-US"/>
               <a:t>Click to edit Master text styles</a:t>
             </a:r>
+            <a:endParaRPr lang="en-US"/>
           </a:p>
           <a:p>
             <a:pPr lvl="1"/>
@@ -1291,6 +1119,7 @@
               <a:rPr lang="en-US"/>
               <a:t>Second level</a:t>
             </a:r>
+            <a:endParaRPr lang="en-US"/>
           </a:p>
           <a:p>
             <a:pPr lvl="2"/>
@@ -1298,6 +1127,7 @@
               <a:rPr lang="en-US"/>
               <a:t>Third level</a:t>
             </a:r>
+            <a:endParaRPr lang="en-US"/>
           </a:p>
           <a:p>
             <a:pPr lvl="3"/>
@@ -1305,6 +1135,7 @@
               <a:rPr lang="en-US"/>
               <a:t>Fourth level</a:t>
             </a:r>
+            <a:endParaRPr lang="en-US"/>
           </a:p>
           <a:p>
             <a:pPr lvl="4"/>
@@ -1312,18 +1143,13 @@
               <a:rPr lang="en-US"/>
               <a:t>Fifth level</a:t>
             </a:r>
-          </a:p>
-        </p:txBody>
-      </p:sp>
-      <p:sp>
-        <p:nvSpPr>
-          <p:cNvPr id="4" name="Content Placeholder 3">
-            <a:extLst>
-              <a:ext uri="{FF2B5EF4-FFF2-40B4-BE49-F238E27FC236}">
-                <a16:creationId xmlns:a16="http://schemas.microsoft.com/office/drawing/2014/main" id="{F08A8211-6683-4B60-8022-A8F14C291AF2}"/>
-              </a:ext>
-            </a:extLst>
-          </p:cNvPr>
+            <a:endParaRPr lang="en-US"/>
+          </a:p>
+        </p:txBody>
+      </p:sp>
+      <p:sp>
+        <p:nvSpPr>
+          <p:cNvPr id="4" name="Content Placeholder 3"/>
           <p:cNvSpPr>
             <a:spLocks noGrp="1"/>
           </p:cNvSpPr>
@@ -1346,6 +1172,7 @@
               <a:rPr lang="en-US"/>
               <a:t>Click to edit Master text styles</a:t>
             </a:r>
+            <a:endParaRPr lang="en-US"/>
           </a:p>
           <a:p>
             <a:pPr lvl="1"/>
@@ -1353,6 +1180,7 @@
               <a:rPr lang="en-US"/>
               <a:t>Second level</a:t>
             </a:r>
+            <a:endParaRPr lang="en-US"/>
           </a:p>
           <a:p>
             <a:pPr lvl="2"/>
@@ -1360,6 +1188,7 @@
               <a:rPr lang="en-US"/>
               <a:t>Third level</a:t>
             </a:r>
+            <a:endParaRPr lang="en-US"/>
           </a:p>
           <a:p>
             <a:pPr lvl="3"/>
@@ -1367,6 +1196,7 @@
               <a:rPr lang="en-US"/>
               <a:t>Fourth level</a:t>
             </a:r>
+            <a:endParaRPr lang="en-US"/>
           </a:p>
           <a:p>
             <a:pPr lvl="4"/>
@@ -1374,18 +1204,13 @@
               <a:rPr lang="en-US"/>
               <a:t>Fifth level</a:t>
             </a:r>
-          </a:p>
-        </p:txBody>
-      </p:sp>
-      <p:sp>
-        <p:nvSpPr>
-          <p:cNvPr id="5" name="Date Placeholder 4">
-            <a:extLst>
-              <a:ext uri="{FF2B5EF4-FFF2-40B4-BE49-F238E27FC236}">
-                <a16:creationId xmlns:a16="http://schemas.microsoft.com/office/drawing/2014/main" id="{2E99842B-93B6-4ABD-B82A-A95C66FE1CED}"/>
-              </a:ext>
-            </a:extLst>
-          </p:cNvPr>
+            <a:endParaRPr lang="en-US"/>
+          </a:p>
+        </p:txBody>
+      </p:sp>
+      <p:sp>
+        <p:nvSpPr>
+          <p:cNvPr id="5" name="Date Placeholder 4"/>
           <p:cNvSpPr>
             <a:spLocks noGrp="1"/>
           </p:cNvSpPr>
@@ -1400,7 +1225,6 @@
           <a:p>
             <a:fld id="{2878B8A3-BBD2-47F7-8BFF-31B2485CEB88}" type="datetimeFigureOut">
               <a:rPr lang="en-US" smtClean="0"/>
-              <a:t>5/15/2020</a:t>
             </a:fld>
             <a:endParaRPr lang="en-US"/>
           </a:p>
@@ -1408,13 +1232,7 @@
       </p:sp>
       <p:sp>
         <p:nvSpPr>
-          <p:cNvPr id="6" name="Footer Placeholder 5">
-            <a:extLst>
-              <a:ext uri="{FF2B5EF4-FFF2-40B4-BE49-F238E27FC236}">
-                <a16:creationId xmlns:a16="http://schemas.microsoft.com/office/drawing/2014/main" id="{458DEEFA-9550-4EBF-9A36-835B38E70000}"/>
-              </a:ext>
-            </a:extLst>
-          </p:cNvPr>
+          <p:cNvPr id="6" name="Footer Placeholder 5"/>
           <p:cNvSpPr>
             <a:spLocks noGrp="1"/>
           </p:cNvSpPr>
@@ -1433,13 +1251,7 @@
       </p:sp>
       <p:sp>
         <p:nvSpPr>
-          <p:cNvPr id="7" name="Slide Number Placeholder 6">
-            <a:extLst>
-              <a:ext uri="{FF2B5EF4-FFF2-40B4-BE49-F238E27FC236}">
-                <a16:creationId xmlns:a16="http://schemas.microsoft.com/office/drawing/2014/main" id="{258C0B90-DBA2-4F5F-AE1C-0859D2AD4E07}"/>
-              </a:ext>
-            </a:extLst>
-          </p:cNvPr>
+          <p:cNvPr id="7" name="Slide Number Placeholder 6"/>
           <p:cNvSpPr>
             <a:spLocks noGrp="1"/>
           </p:cNvSpPr>
@@ -1454,18 +1266,12 @@
           <a:p>
             <a:fld id="{AE807771-59EF-494D-A6AC-A4C25B6BEE57}" type="slidenum">
               <a:rPr lang="en-US" smtClean="0"/>
-              <a:t>‹#›</a:t>
             </a:fld>
             <a:endParaRPr lang="en-US"/>
           </a:p>
         </p:txBody>
       </p:sp>
     </p:spTree>
-    <p:extLst>
-      <p:ext uri="{BB962C8B-B14F-4D97-AF65-F5344CB8AC3E}">
-        <p14:creationId xmlns:p14="http://schemas.microsoft.com/office/powerpoint/2010/main" val="1000393025"/>
-      </p:ext>
-    </p:extLst>
   </p:cSld>
   <p:clrMapOvr>
     <a:masterClrMapping/>
@@ -1492,13 +1298,7 @@
       </p:grpSpPr>
       <p:sp>
         <p:nvSpPr>
-          <p:cNvPr id="2" name="Title 1">
-            <a:extLst>
-              <a:ext uri="{FF2B5EF4-FFF2-40B4-BE49-F238E27FC236}">
-                <a16:creationId xmlns:a16="http://schemas.microsoft.com/office/drawing/2014/main" id="{2CAC9ED7-3653-4F36-92C3-D15C67B1F000}"/>
-              </a:ext>
-            </a:extLst>
-          </p:cNvPr>
+          <p:cNvPr id="2" name="Title 1"/>
           <p:cNvSpPr>
             <a:spLocks noGrp="1"/>
           </p:cNvSpPr>
@@ -1520,18 +1320,13 @@
               <a:rPr lang="en-US"/>
               <a:t>Click to edit Master title style</a:t>
             </a:r>
-          </a:p>
-        </p:txBody>
-      </p:sp>
-      <p:sp>
-        <p:nvSpPr>
-          <p:cNvPr id="3" name="Text Placeholder 2">
-            <a:extLst>
-              <a:ext uri="{FF2B5EF4-FFF2-40B4-BE49-F238E27FC236}">
-                <a16:creationId xmlns:a16="http://schemas.microsoft.com/office/drawing/2014/main" id="{44BE8303-FE02-4C41-9C4A-65F3D782CAC1}"/>
-              </a:ext>
-            </a:extLst>
-          </p:cNvPr>
+            <a:endParaRPr lang="en-US"/>
+          </a:p>
+        </p:txBody>
+      </p:sp>
+      <p:sp>
+        <p:nvSpPr>
+          <p:cNvPr id="3" name="Text Placeholder 2"/>
           <p:cNvSpPr>
             <a:spLocks noGrp="1"/>
           </p:cNvSpPr>
@@ -1591,18 +1386,13 @@
               <a:rPr lang="en-US"/>
               <a:t>Click to edit Master text styles</a:t>
             </a:r>
-          </a:p>
-        </p:txBody>
-      </p:sp>
-      <p:sp>
-        <p:nvSpPr>
-          <p:cNvPr id="4" name="Content Placeholder 3">
-            <a:extLst>
-              <a:ext uri="{FF2B5EF4-FFF2-40B4-BE49-F238E27FC236}">
-                <a16:creationId xmlns:a16="http://schemas.microsoft.com/office/drawing/2014/main" id="{58360CC8-4F64-442C-A2E8-AD3411EECDF1}"/>
-              </a:ext>
-            </a:extLst>
-          </p:cNvPr>
+            <a:endParaRPr lang="en-US"/>
+          </a:p>
+        </p:txBody>
+      </p:sp>
+      <p:sp>
+        <p:nvSpPr>
+          <p:cNvPr id="4" name="Content Placeholder 3"/>
           <p:cNvSpPr>
             <a:spLocks noGrp="1"/>
           </p:cNvSpPr>
@@ -1625,6 +1415,7 @@
               <a:rPr lang="en-US"/>
               <a:t>Click to edit Master text styles</a:t>
             </a:r>
+            <a:endParaRPr lang="en-US"/>
           </a:p>
           <a:p>
             <a:pPr lvl="1"/>
@@ -1632,6 +1423,7 @@
               <a:rPr lang="en-US"/>
               <a:t>Second level</a:t>
             </a:r>
+            <a:endParaRPr lang="en-US"/>
           </a:p>
           <a:p>
             <a:pPr lvl="2"/>
@@ -1639,6 +1431,7 @@
               <a:rPr lang="en-US"/>
               <a:t>Third level</a:t>
             </a:r>
+            <a:endParaRPr lang="en-US"/>
           </a:p>
           <a:p>
             <a:pPr lvl="3"/>
@@ -1646,6 +1439,7 @@
               <a:rPr lang="en-US"/>
               <a:t>Fourth level</a:t>
             </a:r>
+            <a:endParaRPr lang="en-US"/>
           </a:p>
           <a:p>
             <a:pPr lvl="4"/>
@@ -1653,18 +1447,13 @@
               <a:rPr lang="en-US"/>
               <a:t>Fifth level</a:t>
             </a:r>
-          </a:p>
-        </p:txBody>
-      </p:sp>
-      <p:sp>
-        <p:nvSpPr>
-          <p:cNvPr id="5" name="Text Placeholder 4">
-            <a:extLst>
-              <a:ext uri="{FF2B5EF4-FFF2-40B4-BE49-F238E27FC236}">
-                <a16:creationId xmlns:a16="http://schemas.microsoft.com/office/drawing/2014/main" id="{F42445B7-8AC1-4749-BBCD-60894E3663B9}"/>
-              </a:ext>
-            </a:extLst>
-          </p:cNvPr>
+            <a:endParaRPr lang="en-US"/>
+          </a:p>
+        </p:txBody>
+      </p:sp>
+      <p:sp>
+        <p:nvSpPr>
+          <p:cNvPr id="5" name="Text Placeholder 4"/>
           <p:cNvSpPr>
             <a:spLocks noGrp="1"/>
           </p:cNvSpPr>
@@ -1724,18 +1513,13 @@
               <a:rPr lang="en-US"/>
               <a:t>Click to edit Master text styles</a:t>
             </a:r>
-          </a:p>
-        </p:txBody>
-      </p:sp>
-      <p:sp>
-        <p:nvSpPr>
-          <p:cNvPr id="6" name="Content Placeholder 5">
-            <a:extLst>
-              <a:ext uri="{FF2B5EF4-FFF2-40B4-BE49-F238E27FC236}">
-                <a16:creationId xmlns:a16="http://schemas.microsoft.com/office/drawing/2014/main" id="{2F85F38E-98E3-4ECE-870E-D1122696619B}"/>
-              </a:ext>
-            </a:extLst>
-          </p:cNvPr>
+            <a:endParaRPr lang="en-US"/>
+          </a:p>
+        </p:txBody>
+      </p:sp>
+      <p:sp>
+        <p:nvSpPr>
+          <p:cNvPr id="6" name="Content Placeholder 5"/>
           <p:cNvSpPr>
             <a:spLocks noGrp="1"/>
           </p:cNvSpPr>
@@ -1758,6 +1542,7 @@
               <a:rPr lang="en-US"/>
               <a:t>Click to edit Master text styles</a:t>
             </a:r>
+            <a:endParaRPr lang="en-US"/>
           </a:p>
           <a:p>
             <a:pPr lvl="1"/>
@@ -1765,6 +1550,7 @@
               <a:rPr lang="en-US"/>
               <a:t>Second level</a:t>
             </a:r>
+            <a:endParaRPr lang="en-US"/>
           </a:p>
           <a:p>
             <a:pPr lvl="2"/>
@@ -1772,6 +1558,7 @@
               <a:rPr lang="en-US"/>
               <a:t>Third level</a:t>
             </a:r>
+            <a:endParaRPr lang="en-US"/>
           </a:p>
           <a:p>
             <a:pPr lvl="3"/>
@@ -1779,6 +1566,7 @@
               <a:rPr lang="en-US"/>
               <a:t>Fourth level</a:t>
             </a:r>
+            <a:endParaRPr lang="en-US"/>
           </a:p>
           <a:p>
             <a:pPr lvl="4"/>
@@ -1786,18 +1574,13 @@
               <a:rPr lang="en-US"/>
               <a:t>Fifth level</a:t>
             </a:r>
-          </a:p>
-        </p:txBody>
-      </p:sp>
-      <p:sp>
-        <p:nvSpPr>
-          <p:cNvPr id="7" name="Date Placeholder 6">
-            <a:extLst>
-              <a:ext uri="{FF2B5EF4-FFF2-40B4-BE49-F238E27FC236}">
-                <a16:creationId xmlns:a16="http://schemas.microsoft.com/office/drawing/2014/main" id="{7E6669FD-4D00-438C-907D-F123956E54B9}"/>
-              </a:ext>
-            </a:extLst>
-          </p:cNvPr>
+            <a:endParaRPr lang="en-US"/>
+          </a:p>
+        </p:txBody>
+      </p:sp>
+      <p:sp>
+        <p:nvSpPr>
+          <p:cNvPr id="7" name="Date Placeholder 6"/>
           <p:cNvSpPr>
             <a:spLocks noGrp="1"/>
           </p:cNvSpPr>
@@ -1812,7 +1595,6 @@
           <a:p>
             <a:fld id="{2878B8A3-BBD2-47F7-8BFF-31B2485CEB88}" type="datetimeFigureOut">
               <a:rPr lang="en-US" smtClean="0"/>
-              <a:t>5/15/2020</a:t>
             </a:fld>
             <a:endParaRPr lang="en-US"/>
           </a:p>
@@ -1820,13 +1602,7 @@
       </p:sp>
       <p:sp>
         <p:nvSpPr>
-          <p:cNvPr id="8" name="Footer Placeholder 7">
-            <a:extLst>
-              <a:ext uri="{FF2B5EF4-FFF2-40B4-BE49-F238E27FC236}">
-                <a16:creationId xmlns:a16="http://schemas.microsoft.com/office/drawing/2014/main" id="{8C0D9FA2-3C50-41F5-B087-52D26A8DCF27}"/>
-              </a:ext>
-            </a:extLst>
-          </p:cNvPr>
+          <p:cNvPr id="8" name="Footer Placeholder 7"/>
           <p:cNvSpPr>
             <a:spLocks noGrp="1"/>
           </p:cNvSpPr>
@@ -1845,13 +1621,7 @@
       </p:sp>
       <p:sp>
         <p:nvSpPr>
-          <p:cNvPr id="9" name="Slide Number Placeholder 8">
-            <a:extLst>
-              <a:ext uri="{FF2B5EF4-FFF2-40B4-BE49-F238E27FC236}">
-                <a16:creationId xmlns:a16="http://schemas.microsoft.com/office/drawing/2014/main" id="{36A4C88F-B016-4BA8-97D1-8766E807AE56}"/>
-              </a:ext>
-            </a:extLst>
-          </p:cNvPr>
+          <p:cNvPr id="9" name="Slide Number Placeholder 8"/>
           <p:cNvSpPr>
             <a:spLocks noGrp="1"/>
           </p:cNvSpPr>
@@ -1866,18 +1636,12 @@
           <a:p>
             <a:fld id="{AE807771-59EF-494D-A6AC-A4C25B6BEE57}" type="slidenum">
               <a:rPr lang="en-US" smtClean="0"/>
-              <a:t>‹#›</a:t>
             </a:fld>
             <a:endParaRPr lang="en-US"/>
           </a:p>
         </p:txBody>
       </p:sp>
     </p:spTree>
-    <p:extLst>
-      <p:ext uri="{BB962C8B-B14F-4D97-AF65-F5344CB8AC3E}">
-        <p14:creationId xmlns:p14="http://schemas.microsoft.com/office/powerpoint/2010/main" val="2713992762"/>
-      </p:ext>
-    </p:extLst>
   </p:cSld>
   <p:clrMapOvr>
     <a:masterClrMapping/>
@@ -1904,13 +1668,7 @@
       </p:grpSpPr>
       <p:sp>
         <p:nvSpPr>
-          <p:cNvPr id="2" name="Title 1">
-            <a:extLst>
-              <a:ext uri="{FF2B5EF4-FFF2-40B4-BE49-F238E27FC236}">
-                <a16:creationId xmlns:a16="http://schemas.microsoft.com/office/drawing/2014/main" id="{58FFBA32-9203-4A7D-8CDD-87C82CF9F4D8}"/>
-              </a:ext>
-            </a:extLst>
-          </p:cNvPr>
+          <p:cNvPr id="2" name="Title 1"/>
           <p:cNvSpPr>
             <a:spLocks noGrp="1"/>
           </p:cNvSpPr>
@@ -1927,18 +1685,13 @@
               <a:rPr lang="en-US"/>
               <a:t>Click to edit Master title style</a:t>
             </a:r>
-          </a:p>
-        </p:txBody>
-      </p:sp>
-      <p:sp>
-        <p:nvSpPr>
-          <p:cNvPr id="3" name="Date Placeholder 2">
-            <a:extLst>
-              <a:ext uri="{FF2B5EF4-FFF2-40B4-BE49-F238E27FC236}">
-                <a16:creationId xmlns:a16="http://schemas.microsoft.com/office/drawing/2014/main" id="{B6CB76A1-4C9E-4FB8-9543-5E864D5E9A13}"/>
-              </a:ext>
-            </a:extLst>
-          </p:cNvPr>
+            <a:endParaRPr lang="en-US"/>
+          </a:p>
+        </p:txBody>
+      </p:sp>
+      <p:sp>
+        <p:nvSpPr>
+          <p:cNvPr id="3" name="Date Placeholder 2"/>
           <p:cNvSpPr>
             <a:spLocks noGrp="1"/>
           </p:cNvSpPr>
@@ -1953,7 +1706,6 @@
           <a:p>
             <a:fld id="{2878B8A3-BBD2-47F7-8BFF-31B2485CEB88}" type="datetimeFigureOut">
               <a:rPr lang="en-US" smtClean="0"/>
-              <a:t>5/15/2020</a:t>
             </a:fld>
             <a:endParaRPr lang="en-US"/>
           </a:p>
@@ -1961,13 +1713,7 @@
       </p:sp>
       <p:sp>
         <p:nvSpPr>
-          <p:cNvPr id="4" name="Footer Placeholder 3">
-            <a:extLst>
-              <a:ext uri="{FF2B5EF4-FFF2-40B4-BE49-F238E27FC236}">
-                <a16:creationId xmlns:a16="http://schemas.microsoft.com/office/drawing/2014/main" id="{69F1CABF-FA2D-4F4C-9C7F-D1E23097B56C}"/>
-              </a:ext>
-            </a:extLst>
-          </p:cNvPr>
+          <p:cNvPr id="4" name="Footer Placeholder 3"/>
           <p:cNvSpPr>
             <a:spLocks noGrp="1"/>
           </p:cNvSpPr>
@@ -1986,13 +1732,7 @@
       </p:sp>
       <p:sp>
         <p:nvSpPr>
-          <p:cNvPr id="5" name="Slide Number Placeholder 4">
-            <a:extLst>
-              <a:ext uri="{FF2B5EF4-FFF2-40B4-BE49-F238E27FC236}">
-                <a16:creationId xmlns:a16="http://schemas.microsoft.com/office/drawing/2014/main" id="{C5CAABB9-A07F-42F9-BAAC-D3564FE69E0B}"/>
-              </a:ext>
-            </a:extLst>
-          </p:cNvPr>
+          <p:cNvPr id="5" name="Slide Number Placeholder 4"/>
           <p:cNvSpPr>
             <a:spLocks noGrp="1"/>
           </p:cNvSpPr>
@@ -2007,18 +1747,12 @@
           <a:p>
             <a:fld id="{AE807771-59EF-494D-A6AC-A4C25B6BEE57}" type="slidenum">
               <a:rPr lang="en-US" smtClean="0"/>
-              <a:t>‹#›</a:t>
             </a:fld>
             <a:endParaRPr lang="en-US"/>
           </a:p>
         </p:txBody>
       </p:sp>
     </p:spTree>
-    <p:extLst>
-      <p:ext uri="{BB962C8B-B14F-4D97-AF65-F5344CB8AC3E}">
-        <p14:creationId xmlns:p14="http://schemas.microsoft.com/office/powerpoint/2010/main" val="2726918302"/>
-      </p:ext>
-    </p:extLst>
   </p:cSld>
   <p:clrMapOvr>
     <a:masterClrMapping/>
@@ -2045,13 +1779,7 @@
       </p:grpSpPr>
       <p:sp>
         <p:nvSpPr>
-          <p:cNvPr id="2" name="Date Placeholder 1">
-            <a:extLst>
-              <a:ext uri="{FF2B5EF4-FFF2-40B4-BE49-F238E27FC236}">
-                <a16:creationId xmlns:a16="http://schemas.microsoft.com/office/drawing/2014/main" id="{D562C801-1C4B-410B-AC06-503C28C7D1A5}"/>
-              </a:ext>
-            </a:extLst>
-          </p:cNvPr>
+          <p:cNvPr id="2" name="Date Placeholder 1"/>
           <p:cNvSpPr>
             <a:spLocks noGrp="1"/>
           </p:cNvSpPr>
@@ -2066,7 +1794,6 @@
           <a:p>
             <a:fld id="{2878B8A3-BBD2-47F7-8BFF-31B2485CEB88}" type="datetimeFigureOut">
               <a:rPr lang="en-US" smtClean="0"/>
-              <a:t>5/15/2020</a:t>
             </a:fld>
             <a:endParaRPr lang="en-US"/>
           </a:p>
@@ -2074,13 +1801,7 @@
       </p:sp>
       <p:sp>
         <p:nvSpPr>
-          <p:cNvPr id="3" name="Footer Placeholder 2">
-            <a:extLst>
-              <a:ext uri="{FF2B5EF4-FFF2-40B4-BE49-F238E27FC236}">
-                <a16:creationId xmlns:a16="http://schemas.microsoft.com/office/drawing/2014/main" id="{6E2FEBE5-2C47-4255-BB5B-BFC622A4BA12}"/>
-              </a:ext>
-            </a:extLst>
-          </p:cNvPr>
+          <p:cNvPr id="3" name="Footer Placeholder 2"/>
           <p:cNvSpPr>
             <a:spLocks noGrp="1"/>
           </p:cNvSpPr>
@@ -2099,13 +1820,7 @@
       </p:sp>
       <p:sp>
         <p:nvSpPr>
-          <p:cNvPr id="4" name="Slide Number Placeholder 3">
-            <a:extLst>
-              <a:ext uri="{FF2B5EF4-FFF2-40B4-BE49-F238E27FC236}">
-                <a16:creationId xmlns:a16="http://schemas.microsoft.com/office/drawing/2014/main" id="{B0CF1756-678B-40A0-8863-485BEA702318}"/>
-              </a:ext>
-            </a:extLst>
-          </p:cNvPr>
+          <p:cNvPr id="4" name="Slide Number Placeholder 3"/>
           <p:cNvSpPr>
             <a:spLocks noGrp="1"/>
           </p:cNvSpPr>
@@ -2120,18 +1835,12 @@
           <a:p>
             <a:fld id="{AE807771-59EF-494D-A6AC-A4C25B6BEE57}" type="slidenum">
               <a:rPr lang="en-US" smtClean="0"/>
-              <a:t>‹#›</a:t>
             </a:fld>
             <a:endParaRPr lang="en-US"/>
           </a:p>
         </p:txBody>
       </p:sp>
     </p:spTree>
-    <p:extLst>
-      <p:ext uri="{BB962C8B-B14F-4D97-AF65-F5344CB8AC3E}">
-        <p14:creationId xmlns:p14="http://schemas.microsoft.com/office/powerpoint/2010/main" val="2504844073"/>
-      </p:ext>
-    </p:extLst>
   </p:cSld>
   <p:clrMapOvr>
     <a:masterClrMapping/>
@@ -2158,13 +1867,7 @@
       </p:grpSpPr>
       <p:sp>
         <p:nvSpPr>
-          <p:cNvPr id="2" name="Title 1">
-            <a:extLst>
-              <a:ext uri="{FF2B5EF4-FFF2-40B4-BE49-F238E27FC236}">
-                <a16:creationId xmlns:a16="http://schemas.microsoft.com/office/drawing/2014/main" id="{55169F43-3350-4781-8004-C7D67AD08D77}"/>
-              </a:ext>
-            </a:extLst>
-          </p:cNvPr>
+          <p:cNvPr id="2" name="Title 1"/>
           <p:cNvSpPr>
             <a:spLocks noGrp="1"/>
           </p:cNvSpPr>
@@ -2190,18 +1893,13 @@
               <a:rPr lang="en-US"/>
               <a:t>Click to edit Master title style</a:t>
             </a:r>
-          </a:p>
-        </p:txBody>
-      </p:sp>
-      <p:sp>
-        <p:nvSpPr>
-          <p:cNvPr id="3" name="Content Placeholder 2">
-            <a:extLst>
-              <a:ext uri="{FF2B5EF4-FFF2-40B4-BE49-F238E27FC236}">
-                <a16:creationId xmlns:a16="http://schemas.microsoft.com/office/drawing/2014/main" id="{3776C559-EB23-4E48-9E40-B76C77261A2E}"/>
-              </a:ext>
-            </a:extLst>
-          </p:cNvPr>
+            <a:endParaRPr lang="en-US"/>
+          </a:p>
+        </p:txBody>
+      </p:sp>
+      <p:sp>
+        <p:nvSpPr>
+          <p:cNvPr id="3" name="Content Placeholder 2"/>
           <p:cNvSpPr>
             <a:spLocks noGrp="1"/>
           </p:cNvSpPr>
@@ -2252,6 +1950,7 @@
               <a:rPr lang="en-US"/>
               <a:t>Click to edit Master text styles</a:t>
             </a:r>
+            <a:endParaRPr lang="en-US"/>
           </a:p>
           <a:p>
             <a:pPr lvl="1"/>
@@ -2259,6 +1958,7 @@
               <a:rPr lang="en-US"/>
               <a:t>Second level</a:t>
             </a:r>
+            <a:endParaRPr lang="en-US"/>
           </a:p>
           <a:p>
             <a:pPr lvl="2"/>
@@ -2266,6 +1966,7 @@
               <a:rPr lang="en-US"/>
               <a:t>Third level</a:t>
             </a:r>
+            <a:endParaRPr lang="en-US"/>
           </a:p>
           <a:p>
             <a:pPr lvl="3"/>
@@ -2273,6 +1974,7 @@
               <a:rPr lang="en-US"/>
               <a:t>Fourth level</a:t>
             </a:r>
+            <a:endParaRPr lang="en-US"/>
           </a:p>
           <a:p>
             <a:pPr lvl="4"/>
@@ -2280,18 +1982,13 @@
               <a:rPr lang="en-US"/>
               <a:t>Fifth level</a:t>
             </a:r>
-          </a:p>
-        </p:txBody>
-      </p:sp>
-      <p:sp>
-        <p:nvSpPr>
-          <p:cNvPr id="4" name="Text Placeholder 3">
-            <a:extLst>
-              <a:ext uri="{FF2B5EF4-FFF2-40B4-BE49-F238E27FC236}">
-                <a16:creationId xmlns:a16="http://schemas.microsoft.com/office/drawing/2014/main" id="{3808CD53-F6A2-405D-9CF6-92705E399DEE}"/>
-              </a:ext>
-            </a:extLst>
-          </p:cNvPr>
+            <a:endParaRPr lang="en-US"/>
+          </a:p>
+        </p:txBody>
+      </p:sp>
+      <p:sp>
+        <p:nvSpPr>
+          <p:cNvPr id="4" name="Text Placeholder 3"/>
           <p:cNvSpPr>
             <a:spLocks noGrp="1"/>
           </p:cNvSpPr>
@@ -2351,18 +2048,13 @@
               <a:rPr lang="en-US"/>
               <a:t>Click to edit Master text styles</a:t>
             </a:r>
-          </a:p>
-        </p:txBody>
-      </p:sp>
-      <p:sp>
-        <p:nvSpPr>
-          <p:cNvPr id="5" name="Date Placeholder 4">
-            <a:extLst>
-              <a:ext uri="{FF2B5EF4-FFF2-40B4-BE49-F238E27FC236}">
-                <a16:creationId xmlns:a16="http://schemas.microsoft.com/office/drawing/2014/main" id="{EBA00EEC-BEED-4FD9-B94F-414D0598B614}"/>
-              </a:ext>
-            </a:extLst>
-          </p:cNvPr>
+            <a:endParaRPr lang="en-US"/>
+          </a:p>
+        </p:txBody>
+      </p:sp>
+      <p:sp>
+        <p:nvSpPr>
+          <p:cNvPr id="5" name="Date Placeholder 4"/>
           <p:cNvSpPr>
             <a:spLocks noGrp="1"/>
           </p:cNvSpPr>
@@ -2377,7 +2069,6 @@
           <a:p>
             <a:fld id="{2878B8A3-BBD2-47F7-8BFF-31B2485CEB88}" type="datetimeFigureOut">
               <a:rPr lang="en-US" smtClean="0"/>
-              <a:t>5/15/2020</a:t>
             </a:fld>
             <a:endParaRPr lang="en-US"/>
           </a:p>
@@ -2385,13 +2076,7 @@
       </p:sp>
       <p:sp>
         <p:nvSpPr>
-          <p:cNvPr id="6" name="Footer Placeholder 5">
-            <a:extLst>
-              <a:ext uri="{FF2B5EF4-FFF2-40B4-BE49-F238E27FC236}">
-                <a16:creationId xmlns:a16="http://schemas.microsoft.com/office/drawing/2014/main" id="{5824A35C-F33D-4ED3-8E15-BE675A14C462}"/>
-              </a:ext>
-            </a:extLst>
-          </p:cNvPr>
+          <p:cNvPr id="6" name="Footer Placeholder 5"/>
           <p:cNvSpPr>
             <a:spLocks noGrp="1"/>
           </p:cNvSpPr>
@@ -2410,13 +2095,7 @@
       </p:sp>
       <p:sp>
         <p:nvSpPr>
-          <p:cNvPr id="7" name="Slide Number Placeholder 6">
-            <a:extLst>
-              <a:ext uri="{FF2B5EF4-FFF2-40B4-BE49-F238E27FC236}">
-                <a16:creationId xmlns:a16="http://schemas.microsoft.com/office/drawing/2014/main" id="{162FC5CC-8468-44C6-A3BB-5E172B37E24B}"/>
-              </a:ext>
-            </a:extLst>
-          </p:cNvPr>
+          <p:cNvPr id="7" name="Slide Number Placeholder 6"/>
           <p:cNvSpPr>
             <a:spLocks noGrp="1"/>
           </p:cNvSpPr>
@@ -2431,18 +2110,12 @@
           <a:p>
             <a:fld id="{AE807771-59EF-494D-A6AC-A4C25B6BEE57}" type="slidenum">
               <a:rPr lang="en-US" smtClean="0"/>
-              <a:t>‹#›</a:t>
             </a:fld>
             <a:endParaRPr lang="en-US"/>
           </a:p>
         </p:txBody>
       </p:sp>
     </p:spTree>
-    <p:extLst>
-      <p:ext uri="{BB962C8B-B14F-4D97-AF65-F5344CB8AC3E}">
-        <p14:creationId xmlns:p14="http://schemas.microsoft.com/office/powerpoint/2010/main" val="4224160375"/>
-      </p:ext>
-    </p:extLst>
   </p:cSld>
   <p:clrMapOvr>
     <a:masterClrMapping/>
@@ -2469,13 +2142,7 @@
       </p:grpSpPr>
       <p:sp>
         <p:nvSpPr>
-          <p:cNvPr id="2" name="Title 1">
-            <a:extLst>
-              <a:ext uri="{FF2B5EF4-FFF2-40B4-BE49-F238E27FC236}">
-                <a16:creationId xmlns:a16="http://schemas.microsoft.com/office/drawing/2014/main" id="{67CA83CE-CD8C-4AB3-9DBD-85CE6CBDEF01}"/>
-              </a:ext>
-            </a:extLst>
-          </p:cNvPr>
+          <p:cNvPr id="2" name="Title 1"/>
           <p:cNvSpPr>
             <a:spLocks noGrp="1"/>
           </p:cNvSpPr>
@@ -2501,18 +2168,13 @@
               <a:rPr lang="en-US"/>
               <a:t>Click to edit Master title style</a:t>
             </a:r>
-          </a:p>
-        </p:txBody>
-      </p:sp>
-      <p:sp>
-        <p:nvSpPr>
-          <p:cNvPr id="3" name="Picture Placeholder 2">
-            <a:extLst>
-              <a:ext uri="{FF2B5EF4-FFF2-40B4-BE49-F238E27FC236}">
-                <a16:creationId xmlns:a16="http://schemas.microsoft.com/office/drawing/2014/main" id="{63580665-C56B-472F-898A-5C2708018A8E}"/>
-              </a:ext>
-            </a:extLst>
-          </p:cNvPr>
+            <a:endParaRPr lang="en-US"/>
+          </a:p>
+        </p:txBody>
+      </p:sp>
+      <p:sp>
+        <p:nvSpPr>
+          <p:cNvPr id="3" name="Picture Placeholder 2"/>
           <p:cNvSpPr>
             <a:spLocks noGrp="1"/>
           </p:cNvSpPr>
@@ -2573,13 +2235,7 @@
       </p:sp>
       <p:sp>
         <p:nvSpPr>
-          <p:cNvPr id="4" name="Text Placeholder 3">
-            <a:extLst>
-              <a:ext uri="{FF2B5EF4-FFF2-40B4-BE49-F238E27FC236}">
-                <a16:creationId xmlns:a16="http://schemas.microsoft.com/office/drawing/2014/main" id="{C4699C1C-8B9E-407D-A594-7083722EC232}"/>
-              </a:ext>
-            </a:extLst>
-          </p:cNvPr>
+          <p:cNvPr id="4" name="Text Placeholder 3"/>
           <p:cNvSpPr>
             <a:spLocks noGrp="1"/>
           </p:cNvSpPr>
@@ -2639,18 +2295,13 @@
               <a:rPr lang="en-US"/>
               <a:t>Click to edit Master text styles</a:t>
             </a:r>
-          </a:p>
-        </p:txBody>
-      </p:sp>
-      <p:sp>
-        <p:nvSpPr>
-          <p:cNvPr id="5" name="Date Placeholder 4">
-            <a:extLst>
-              <a:ext uri="{FF2B5EF4-FFF2-40B4-BE49-F238E27FC236}">
-                <a16:creationId xmlns:a16="http://schemas.microsoft.com/office/drawing/2014/main" id="{28308812-0A27-41AA-839A-B400DD8EDFC8}"/>
-              </a:ext>
-            </a:extLst>
-          </p:cNvPr>
+            <a:endParaRPr lang="en-US"/>
+          </a:p>
+        </p:txBody>
+      </p:sp>
+      <p:sp>
+        <p:nvSpPr>
+          <p:cNvPr id="5" name="Date Placeholder 4"/>
           <p:cNvSpPr>
             <a:spLocks noGrp="1"/>
           </p:cNvSpPr>
@@ -2665,7 +2316,6 @@
           <a:p>
             <a:fld id="{2878B8A3-BBD2-47F7-8BFF-31B2485CEB88}" type="datetimeFigureOut">
               <a:rPr lang="en-US" smtClean="0"/>
-              <a:t>5/15/2020</a:t>
             </a:fld>
             <a:endParaRPr lang="en-US"/>
           </a:p>
@@ -2673,13 +2323,7 @@
       </p:sp>
       <p:sp>
         <p:nvSpPr>
-          <p:cNvPr id="6" name="Footer Placeholder 5">
-            <a:extLst>
-              <a:ext uri="{FF2B5EF4-FFF2-40B4-BE49-F238E27FC236}">
-                <a16:creationId xmlns:a16="http://schemas.microsoft.com/office/drawing/2014/main" id="{AB5D9082-06B1-4B38-98BA-A100EBFE2525}"/>
-              </a:ext>
-            </a:extLst>
-          </p:cNvPr>
+          <p:cNvPr id="6" name="Footer Placeholder 5"/>
           <p:cNvSpPr>
             <a:spLocks noGrp="1"/>
           </p:cNvSpPr>
@@ -2698,13 +2342,7 @@
       </p:sp>
       <p:sp>
         <p:nvSpPr>
-          <p:cNvPr id="7" name="Slide Number Placeholder 6">
-            <a:extLst>
-              <a:ext uri="{FF2B5EF4-FFF2-40B4-BE49-F238E27FC236}">
-                <a16:creationId xmlns:a16="http://schemas.microsoft.com/office/drawing/2014/main" id="{6192C821-CB0E-45B0-8D35-426E4F285907}"/>
-              </a:ext>
-            </a:extLst>
-          </p:cNvPr>
+          <p:cNvPr id="7" name="Slide Number Placeholder 6"/>
           <p:cNvSpPr>
             <a:spLocks noGrp="1"/>
           </p:cNvSpPr>
@@ -2719,18 +2357,12 @@
           <a:p>
             <a:fld id="{AE807771-59EF-494D-A6AC-A4C25B6BEE57}" type="slidenum">
               <a:rPr lang="en-US" smtClean="0"/>
-              <a:t>‹#›</a:t>
             </a:fld>
             <a:endParaRPr lang="en-US"/>
           </a:p>
         </p:txBody>
       </p:sp>
     </p:spTree>
-    <p:extLst>
-      <p:ext uri="{BB962C8B-B14F-4D97-AF65-F5344CB8AC3E}">
-        <p14:creationId xmlns:p14="http://schemas.microsoft.com/office/powerpoint/2010/main" val="3306017340"/>
-      </p:ext>
-    </p:extLst>
   </p:cSld>
   <p:clrMapOvr>
     <a:masterClrMapping/>
@@ -2762,13 +2394,7 @@
       </p:grpSpPr>
       <p:sp>
         <p:nvSpPr>
-          <p:cNvPr id="2" name="Title Placeholder 1">
-            <a:extLst>
-              <a:ext uri="{FF2B5EF4-FFF2-40B4-BE49-F238E27FC236}">
-                <a16:creationId xmlns:a16="http://schemas.microsoft.com/office/drawing/2014/main" id="{7A9E3363-01FF-4F0E-9C72-F06E3E031DE4}"/>
-              </a:ext>
-            </a:extLst>
-          </p:cNvPr>
+          <p:cNvPr id="2" name="Title Placeholder 1"/>
           <p:cNvSpPr>
             <a:spLocks noGrp="1"/>
           </p:cNvSpPr>
@@ -2795,18 +2421,13 @@
               <a:rPr lang="en-US"/>
               <a:t>Click to edit Master title style</a:t>
             </a:r>
-          </a:p>
-        </p:txBody>
-      </p:sp>
-      <p:sp>
-        <p:nvSpPr>
-          <p:cNvPr id="3" name="Text Placeholder 2">
-            <a:extLst>
-              <a:ext uri="{FF2B5EF4-FFF2-40B4-BE49-F238E27FC236}">
-                <a16:creationId xmlns:a16="http://schemas.microsoft.com/office/drawing/2014/main" id="{A99B44E5-96C6-4AD3-BC36-7B6B8B26BE55}"/>
-              </a:ext>
-            </a:extLst>
-          </p:cNvPr>
+            <a:endParaRPr lang="en-US"/>
+          </a:p>
+        </p:txBody>
+      </p:sp>
+      <p:sp>
+        <p:nvSpPr>
+          <p:cNvPr id="3" name="Text Placeholder 2"/>
           <p:cNvSpPr>
             <a:spLocks noGrp="1"/>
           </p:cNvSpPr>
@@ -2834,6 +2455,7 @@
               <a:rPr lang="en-US"/>
               <a:t>Click to edit Master text styles</a:t>
             </a:r>
+            <a:endParaRPr lang="en-US"/>
           </a:p>
           <a:p>
             <a:pPr lvl="1"/>
@@ -2841,6 +2463,7 @@
               <a:rPr lang="en-US"/>
               <a:t>Second level</a:t>
             </a:r>
+            <a:endParaRPr lang="en-US"/>
           </a:p>
           <a:p>
             <a:pPr lvl="2"/>
@@ -2848,6 +2471,7 @@
               <a:rPr lang="en-US"/>
               <a:t>Third level</a:t>
             </a:r>
+            <a:endParaRPr lang="en-US"/>
           </a:p>
           <a:p>
             <a:pPr lvl="3"/>
@@ -2855,6 +2479,7 @@
               <a:rPr lang="en-US"/>
               <a:t>Fourth level</a:t>
             </a:r>
+            <a:endParaRPr lang="en-US"/>
           </a:p>
           <a:p>
             <a:pPr lvl="4"/>
@@ -2862,18 +2487,13 @@
               <a:rPr lang="en-US"/>
               <a:t>Fifth level</a:t>
             </a:r>
-          </a:p>
-        </p:txBody>
-      </p:sp>
-      <p:sp>
-        <p:nvSpPr>
-          <p:cNvPr id="4" name="Date Placeholder 3">
-            <a:extLst>
-              <a:ext uri="{FF2B5EF4-FFF2-40B4-BE49-F238E27FC236}">
-                <a16:creationId xmlns:a16="http://schemas.microsoft.com/office/drawing/2014/main" id="{AC4AF22F-C12E-472B-8E88-0B9B60348826}"/>
-              </a:ext>
-            </a:extLst>
-          </p:cNvPr>
+            <a:endParaRPr lang="en-US"/>
+          </a:p>
+        </p:txBody>
+      </p:sp>
+      <p:sp>
+        <p:nvSpPr>
+          <p:cNvPr id="4" name="Date Placeholder 3"/>
           <p:cNvSpPr>
             <a:spLocks noGrp="1"/>
           </p:cNvSpPr>
@@ -2906,7 +2526,6 @@
           <a:p>
             <a:fld id="{2878B8A3-BBD2-47F7-8BFF-31B2485CEB88}" type="datetimeFigureOut">
               <a:rPr lang="en-US" smtClean="0"/>
-              <a:t>5/15/2020</a:t>
             </a:fld>
             <a:endParaRPr lang="en-US"/>
           </a:p>
@@ -2914,13 +2533,7 @@
       </p:sp>
       <p:sp>
         <p:nvSpPr>
-          <p:cNvPr id="5" name="Footer Placeholder 4">
-            <a:extLst>
-              <a:ext uri="{FF2B5EF4-FFF2-40B4-BE49-F238E27FC236}">
-                <a16:creationId xmlns:a16="http://schemas.microsoft.com/office/drawing/2014/main" id="{5B5E55AA-7611-48F3-8809-A21C49D56464}"/>
-              </a:ext>
-            </a:extLst>
-          </p:cNvPr>
+          <p:cNvPr id="5" name="Footer Placeholder 4"/>
           <p:cNvSpPr>
             <a:spLocks noGrp="1"/>
           </p:cNvSpPr>
@@ -2957,13 +2570,7 @@
       </p:sp>
       <p:sp>
         <p:nvSpPr>
-          <p:cNvPr id="6" name="Slide Number Placeholder 5">
-            <a:extLst>
-              <a:ext uri="{FF2B5EF4-FFF2-40B4-BE49-F238E27FC236}">
-                <a16:creationId xmlns:a16="http://schemas.microsoft.com/office/drawing/2014/main" id="{72E1868B-2F01-495A-AC3F-2D51837B862A}"/>
-              </a:ext>
-            </a:extLst>
-          </p:cNvPr>
+          <p:cNvPr id="6" name="Slide Number Placeholder 5"/>
           <p:cNvSpPr>
             <a:spLocks noGrp="1"/>
           </p:cNvSpPr>
@@ -2996,18 +2603,12 @@
           <a:p>
             <a:fld id="{AE807771-59EF-494D-A6AC-A4C25B6BEE57}" type="slidenum">
               <a:rPr lang="en-US" smtClean="0"/>
-              <a:t>‹#›</a:t>
             </a:fld>
             <a:endParaRPr lang="en-US"/>
           </a:p>
         </p:txBody>
       </p:sp>
     </p:spTree>
-    <p:extLst>
-      <p:ext uri="{BB962C8B-B14F-4D97-AF65-F5344CB8AC3E}">
-        <p14:creationId xmlns:p14="http://schemas.microsoft.com/office/powerpoint/2010/main" val="2476479467"/>
-      </p:ext>
-    </p:extLst>
   </p:cSld>
   <p:clrMap bg1="lt1" tx1="dk1" bg2="lt2" tx2="dk2" accent1="accent1" accent2="accent2" accent3="accent3" accent4="accent4" accent5="accent5" accent6="accent6" hlink="hlink" folHlink="folHlink"/>
   <p:sldLayoutIdLst>
@@ -3325,13 +2926,7 @@
       </p:grpSpPr>
       <p:sp>
         <p:nvSpPr>
-          <p:cNvPr id="2" name="Title 1">
-            <a:extLst>
-              <a:ext uri="{FF2B5EF4-FFF2-40B4-BE49-F238E27FC236}">
-                <a16:creationId xmlns:a16="http://schemas.microsoft.com/office/drawing/2014/main" id="{83B456F9-5DA5-4CA7-983F-C2B686E1C647}"/>
-              </a:ext>
-            </a:extLst>
-          </p:cNvPr>
+          <p:cNvPr id="2" name="Title 1"/>
           <p:cNvSpPr>
             <a:spLocks noGrp="1"/>
           </p:cNvSpPr>
@@ -3348,18 +2943,13 @@
               <a:rPr lang="en-US" dirty="0"/>
               <a:t>Progress 15 Mei</a:t>
             </a:r>
-          </a:p>
-        </p:txBody>
-      </p:sp>
-      <p:sp>
-        <p:nvSpPr>
-          <p:cNvPr id="3" name="Subtitle 2">
-            <a:extLst>
-              <a:ext uri="{FF2B5EF4-FFF2-40B4-BE49-F238E27FC236}">
-                <a16:creationId xmlns:a16="http://schemas.microsoft.com/office/drawing/2014/main" id="{56FECB50-1D52-4B54-9543-89603B71C58A}"/>
-              </a:ext>
-            </a:extLst>
-          </p:cNvPr>
+            <a:endParaRPr lang="en-US" dirty="0"/>
+          </a:p>
+        </p:txBody>
+      </p:sp>
+      <p:sp>
+        <p:nvSpPr>
+          <p:cNvPr id="3" name="Subtitle 2"/>
           <p:cNvSpPr>
             <a:spLocks noGrp="1"/>
           </p:cNvSpPr>
@@ -3376,15 +2966,11 @@
               <a:rPr lang="en-US" dirty="0"/>
               <a:t>Set socket untuk aplikasi chat.</a:t>
             </a:r>
+            <a:endParaRPr lang="en-US" dirty="0"/>
           </a:p>
         </p:txBody>
       </p:sp>
     </p:spTree>
-    <p:extLst>
-      <p:ext uri="{BB962C8B-B14F-4D97-AF65-F5344CB8AC3E}">
-        <p14:creationId xmlns:p14="http://schemas.microsoft.com/office/powerpoint/2010/main" val="2025820292"/>
-      </p:ext>
-    </p:extLst>
   </p:cSld>
   <p:clrMapOvr>
     <a:masterClrMapping/>
@@ -3411,13 +2997,7 @@
       </p:grpSpPr>
       <p:sp>
         <p:nvSpPr>
-          <p:cNvPr id="2" name="Title 1">
-            <a:extLst>
-              <a:ext uri="{FF2B5EF4-FFF2-40B4-BE49-F238E27FC236}">
-                <a16:creationId xmlns:a16="http://schemas.microsoft.com/office/drawing/2014/main" id="{BF12DE09-8E7A-4681-8BEC-B987169A5B6A}"/>
-              </a:ext>
-            </a:extLst>
-          </p:cNvPr>
+          <p:cNvPr id="2" name="Title 1"/>
           <p:cNvSpPr>
             <a:spLocks noGrp="1"/>
           </p:cNvSpPr>
@@ -3444,13 +3024,7 @@
       </p:sp>
       <p:sp>
         <p:nvSpPr>
-          <p:cNvPr id="3" name="Content Placeholder 2">
-            <a:extLst>
-              <a:ext uri="{FF2B5EF4-FFF2-40B4-BE49-F238E27FC236}">
-                <a16:creationId xmlns:a16="http://schemas.microsoft.com/office/drawing/2014/main" id="{0E0E050D-84F0-4BD5-9D58-BDD69F3173A8}"/>
-              </a:ext>
-            </a:extLst>
-          </p:cNvPr>
+          <p:cNvPr id="3" name="Content Placeholder 2"/>
           <p:cNvSpPr>
             <a:spLocks noGrp="1"/>
           </p:cNvSpPr>
@@ -3483,6 +3057,7 @@
               <a:rPr lang="en-US" dirty="0"/>
               <a:t>.</a:t>
             </a:r>
+            <a:endParaRPr lang="en-US" dirty="0"/>
           </a:p>
           <a:p>
             <a:r>
@@ -3501,6 +3076,7 @@
               <a:rPr lang="en-US" dirty="0"/>
               <a:t> client-server dengan socket.</a:t>
             </a:r>
+            <a:endParaRPr lang="en-US" dirty="0"/>
           </a:p>
           <a:p>
             <a:r>
@@ -3519,6 +3095,7 @@
               <a:rPr lang="en-US" dirty="0"/>
               <a:t> ke FTP Server.</a:t>
             </a:r>
+            <a:endParaRPr lang="en-US" dirty="0"/>
           </a:p>
           <a:p>
             <a:r>
@@ -3541,15 +3118,18 @@
               <a:rPr lang="en-US" dirty="0"/>
               <a:t> FTP server.</a:t>
             </a:r>
+            <a:endParaRPr lang="en-US" dirty="0"/>
+          </a:p>
+          <a:p>
+            <a:r>
+              <a:rPr lang="en-US" dirty="0"/>
+              <a:t>Desain kasar layout (wireframe)</a:t>
+            </a:r>
+            <a:endParaRPr lang="en-US" dirty="0"/>
           </a:p>
         </p:txBody>
       </p:sp>
     </p:spTree>
-    <p:extLst>
-      <p:ext uri="{BB962C8B-B14F-4D97-AF65-F5344CB8AC3E}">
-        <p14:creationId xmlns:p14="http://schemas.microsoft.com/office/powerpoint/2010/main" val="3245877664"/>
-      </p:ext>
-    </p:extLst>
   </p:cSld>
   <p:clrMapOvr>
     <a:masterClrMapping/>
@@ -3566,6 +3146,97 @@
         <p:cNvGrpSpPr/>
         <p:nvPr/>
       </p:nvGrpSpPr>
+      <p:grpSpPr/>
+      <p:pic>
+        <p:nvPicPr>
+          <p:cNvPr id="4" name="Content Placeholder 3" descr="chat-01"/>
+          <p:cNvPicPr>
+            <a:picLocks noChangeAspect="1"/>
+          </p:cNvPicPr>
+          <p:nvPr>
+            <p:ph idx="1"/>
+          </p:nvPr>
+        </p:nvPicPr>
+        <p:blipFill>
+          <a:blip r:embed="rId1"/>
+          <a:stretch>
+            <a:fillRect/>
+          </a:stretch>
+        </p:blipFill>
+        <p:spPr>
+          <a:xfrm>
+            <a:off x="1550670" y="826770"/>
+            <a:ext cx="9307830" cy="5236210"/>
+          </a:xfrm>
+          <a:prstGeom prst="rect">
+            <a:avLst/>
+          </a:prstGeom>
+        </p:spPr>
+      </p:pic>
+      <p:sp>
+        <p:nvSpPr>
+          <p:cNvPr id="5" name="Rectangle 4"/>
+          <p:cNvSpPr/>
+          <p:nvPr/>
+        </p:nvSpPr>
+        <p:spPr>
+          <a:xfrm>
+            <a:off x="1512570" y="777875"/>
+            <a:ext cx="9384030" cy="5334000"/>
+          </a:xfrm>
+          <a:prstGeom prst="rect">
+            <a:avLst/>
+          </a:prstGeom>
+          <a:noFill/>
+          <a:extLst>
+            <a:ext uri="{909E8E84-426E-40DD-AFC4-6F175D3DCCD1}">
+              <a14:hiddenFill xmlns:a14="http://schemas.microsoft.com/office/drawing/2010/main">
+                <a:solidFill>
+                  <a:schemeClr val="accent2"/>
+                </a:solidFill>
+              </a14:hiddenFill>
+            </a:ext>
+          </a:extLst>
+        </p:spPr>
+        <p:style>
+          <a:lnRef idx="2">
+            <a:schemeClr val="dk1"/>
+          </a:lnRef>
+          <a:fillRef idx="1">
+            <a:schemeClr val="lt1"/>
+          </a:fillRef>
+          <a:effectRef idx="0">
+            <a:schemeClr val="dk1"/>
+          </a:effectRef>
+          <a:fontRef idx="minor">
+            <a:schemeClr val="dk1"/>
+          </a:fontRef>
+        </p:style>
+        <p:txBody>
+          <a:bodyPr rtlCol="0" anchor="ctr"/>
+          <a:p>
+            <a:pPr algn="ctr"/>
+            <a:endParaRPr lang="en-US"/>
+          </a:p>
+        </p:txBody>
+      </p:sp>
+    </p:spTree>
+  </p:cSld>
+  <p:clrMapOvr>
+    <a:masterClrMapping/>
+  </p:clrMapOvr>
+</p:sld>
+</file>
+
+<file path=ppt/slides/slide4.xml><?xml version="1.0" encoding="utf-8"?>
+<p:sld xmlns:a="http://schemas.openxmlformats.org/drawingml/2006/main" xmlns:r="http://schemas.openxmlformats.org/officeDocument/2006/relationships" xmlns:p="http://schemas.openxmlformats.org/presentationml/2006/main">
+  <p:cSld>
+    <p:spTree>
+      <p:nvGrpSpPr>
+        <p:cNvPr id="1" name=""/>
+        <p:cNvGrpSpPr/>
+        <p:nvPr/>
+      </p:nvGrpSpPr>
       <p:grpSpPr>
         <a:xfrm>
           <a:off x="0" y="0"/>
@@ -3576,13 +3247,7 @@
       </p:grpSpPr>
       <p:sp>
         <p:nvSpPr>
-          <p:cNvPr id="2" name="Title 1">
-            <a:extLst>
-              <a:ext uri="{FF2B5EF4-FFF2-40B4-BE49-F238E27FC236}">
-                <a16:creationId xmlns:a16="http://schemas.microsoft.com/office/drawing/2014/main" id="{D84FB831-DF3E-4B4A-98C4-243AD33EFD47}"/>
-              </a:ext>
-            </a:extLst>
-          </p:cNvPr>
+          <p:cNvPr id="2" name="Title 1"/>
           <p:cNvSpPr>
             <a:spLocks noGrp="1"/>
           </p:cNvSpPr>
@@ -3617,13 +3282,7 @@
       </p:sp>
       <p:sp>
         <p:nvSpPr>
-          <p:cNvPr id="3" name="Content Placeholder 2">
-            <a:extLst>
-              <a:ext uri="{FF2B5EF4-FFF2-40B4-BE49-F238E27FC236}">
-                <a16:creationId xmlns:a16="http://schemas.microsoft.com/office/drawing/2014/main" id="{9E520FC4-DFA8-42C7-8395-E988156BF638}"/>
-              </a:ext>
-            </a:extLst>
-          </p:cNvPr>
+          <p:cNvPr id="3" name="Content Placeholder 2"/>
           <p:cNvSpPr>
             <a:spLocks noGrp="1"/>
           </p:cNvSpPr>
@@ -3648,6 +3307,7 @@
               <a:rPr lang="en-US" dirty="0"/>
               <a:t>.</a:t>
             </a:r>
+            <a:endParaRPr lang="en-US" dirty="0"/>
           </a:p>
           <a:p>
             <a:r>
@@ -3667,11 +3327,6 @@
         </p:txBody>
       </p:sp>
     </p:spTree>
-    <p:extLst>
-      <p:ext uri="{BB962C8B-B14F-4D97-AF65-F5344CB8AC3E}">
-        <p14:creationId xmlns:p14="http://schemas.microsoft.com/office/powerpoint/2010/main" val="1277394206"/>
-      </p:ext>
-    </p:extLst>
   </p:cSld>
   <p:clrMapOvr>
     <a:masterClrMapping/>
@@ -3722,7 +3377,7 @@
     </a:clrScheme>
     <a:fontScheme name="Office">
       <a:majorFont>
-        <a:latin typeface="Calibri Light" panose="020F0302020204030204"/>
+        <a:latin typeface="Calibri Light"/>
         <a:ea typeface=""/>
         <a:cs typeface=""/>
         <a:font script="Jpan" typeface="游ゴシック Light"/>
@@ -3755,26 +3410,9 @@
         <a:font script="Viet" typeface="Times New Roman"/>
         <a:font script="Uigh" typeface="Microsoft Uighur"/>
         <a:font script="Geor" typeface="Sylfaen"/>
-        <a:font script="Armn" typeface="Arial"/>
-        <a:font script="Bugi" typeface="Leelawadee UI"/>
-        <a:font script="Bopo" typeface="Microsoft JhengHei"/>
-        <a:font script="Java" typeface="Javanese Text"/>
-        <a:font script="Lisu" typeface="Segoe UI"/>
-        <a:font script="Mymr" typeface="Myanmar Text"/>
-        <a:font script="Nkoo" typeface="Ebrima"/>
-        <a:font script="Olck" typeface="Nirmala UI"/>
-        <a:font script="Osma" typeface="Ebrima"/>
-        <a:font script="Phag" typeface="Phagspa"/>
-        <a:font script="Syrn" typeface="Estrangelo Edessa"/>
-        <a:font script="Syrj" typeface="Estrangelo Edessa"/>
-        <a:font script="Syre" typeface="Estrangelo Edessa"/>
-        <a:font script="Sora" typeface="Nirmala UI"/>
-        <a:font script="Tale" typeface="Microsoft Tai Le"/>
-        <a:font script="Talu" typeface="Microsoft New Tai Lue"/>
-        <a:font script="Tfng" typeface="Ebrima"/>
       </a:majorFont>
       <a:minorFont>
-        <a:latin typeface="Calibri" panose="020F0502020204030204"/>
+        <a:latin typeface="Calibri"/>
         <a:ea typeface=""/>
         <a:cs typeface=""/>
         <a:font script="Jpan" typeface="游ゴシック"/>
@@ -3807,23 +3445,6 @@
         <a:font script="Viet" typeface="Arial"/>
         <a:font script="Uigh" typeface="Microsoft Uighur"/>
         <a:font script="Geor" typeface="Sylfaen"/>
-        <a:font script="Armn" typeface="Arial"/>
-        <a:font script="Bugi" typeface="Leelawadee UI"/>
-        <a:font script="Bopo" typeface="Microsoft JhengHei"/>
-        <a:font script="Java" typeface="Javanese Text"/>
-        <a:font script="Lisu" typeface="Segoe UI"/>
-        <a:font script="Mymr" typeface="Myanmar Text"/>
-        <a:font script="Nkoo" typeface="Ebrima"/>
-        <a:font script="Olck" typeface="Nirmala UI"/>
-        <a:font script="Osma" typeface="Ebrima"/>
-        <a:font script="Phag" typeface="Phagspa"/>
-        <a:font script="Syrn" typeface="Estrangelo Edessa"/>
-        <a:font script="Syrj" typeface="Estrangelo Edessa"/>
-        <a:font script="Syre" typeface="Estrangelo Edessa"/>
-        <a:font script="Sora" typeface="Nirmala UI"/>
-        <a:font script="Tale" typeface="Microsoft Tai Le"/>
-        <a:font script="Talu" typeface="Microsoft New Tai Lue"/>
-        <a:font script="Tfng" typeface="Ebrima"/>
       </a:minorFont>
     </a:fontScheme>
     <a:fmtScheme name="Office">
@@ -3964,8 +3585,6 @@
       </a:bgFillStyleLst>
     </a:fmtScheme>
   </a:themeElements>
-  <a:objectDefaults/>
-  <a:extraClrSchemeLst/>
   <a:extLst>
     <a:ext uri="{05A4C25C-085E-4340-85A3-A5531E510DB2}">
       <thm15:themeFamily xmlns:thm15="http://schemas.microsoft.com/office/thememl/2012/main" name="Office Theme" id="{62F939B6-93AF-4DB8-9C6B-D6C7DFDC589F}" vid="{4A3C46E8-61CC-4603-A589-7422A47A8E4A}"/>

</xml_diff>